<commit_message>
Add a few final points.
</commit_message>
<xml_diff>
--- a/outside in with specflow/Outside In With SpecFlow.pptx
+++ b/outside in with specflow/Outside In With SpecFlow.pptx
@@ -5,10 +5,10 @@
     <p:sldMasterId id="2147483648" r:id="rId1"/>
   </p:sldMasterIdLst>
   <p:notesMasterIdLst>
-    <p:notesMasterId r:id="rId12"/>
+    <p:notesMasterId r:id="rId13"/>
   </p:notesMasterIdLst>
   <p:handoutMasterIdLst>
-    <p:handoutMasterId r:id="rId13"/>
+    <p:handoutMasterId r:id="rId14"/>
   </p:handoutMasterIdLst>
   <p:sldIdLst>
     <p:sldId id="259" r:id="rId2"/>
@@ -20,7 +20,8 @@
     <p:sldId id="310" r:id="rId8"/>
     <p:sldId id="282" r:id="rId9"/>
     <p:sldId id="290" r:id="rId10"/>
-    <p:sldId id="301" r:id="rId11"/>
+    <p:sldId id="311" r:id="rId11"/>
+    <p:sldId id="301" r:id="rId12"/>
   </p:sldIdLst>
   <p:sldSz cx="9144000" cy="6858000" type="screen4x3"/>
   <p:notesSz cx="6858000" cy="9144000"/>
@@ -137,6 +138,7 @@
             <p14:sldId id="310"/>
             <p14:sldId id="282"/>
             <p14:sldId id="290"/>
+            <p14:sldId id="311"/>
             <p14:sldId id="301"/>
           </p14:sldIdLst>
         </p14:section>
@@ -229,7 +231,7 @@
             <a:fld id="{D83FDC75-7F73-4A4A-A77C-09AADF00E0EA}" type="datetimeFigureOut">
               <a:rPr lang="en-US" smtClean="0"/>
               <a:pPr/>
-              <a:t>11/4/2010</a:t>
+              <a:t>11/6/2010</a:t>
             </a:fld>
             <a:endParaRPr lang="en-US" dirty="0"/>
           </a:p>
@@ -396,7 +398,7 @@
             <a:fld id="{48AEF76B-3757-4A0B-AF93-28494465C1DD}" type="datetimeFigureOut">
               <a:rPr lang="en-US" smtClean="0"/>
               <a:pPr/>
-              <a:t>11/4/2010</a:t>
+              <a:t>11/6/2010</a:t>
             </a:fld>
             <a:endParaRPr lang="en-US" dirty="0"/>
           </a:p>
@@ -955,21 +957,125 @@
         </p:nvSpPr>
         <p:spPr/>
         <p:txBody>
+          <a:bodyPr>
+            <a:normAutofit/>
+          </a:bodyPr>
+          <a:lstStyle/>
+          <a:p>
+            <a:pPr>
+              <a:lnSpc>
+                <a:spcPct val="80000"/>
+              </a:lnSpc>
+            </a:pPr>
+            <a:r>
+              <a:rPr lang="en-US" dirty="0" smtClean="0"/>
+              <a:t>Give a brief overview of the presentation.</a:t>
+            </a:r>
+            <a:r>
+              <a:rPr lang="en-US" baseline="0" dirty="0" smtClean="0"/>
+              <a:t> D</a:t>
+            </a:r>
+            <a:r>
+              <a:rPr lang="en-US" dirty="0" smtClean="0"/>
+              <a:t>escribe the major focus of the presentation and why it is important.</a:t>
+            </a:r>
+          </a:p>
+          <a:p>
+            <a:pPr>
+              <a:lnSpc>
+                <a:spcPct val="80000"/>
+              </a:lnSpc>
+            </a:pPr>
+            <a:r>
+              <a:rPr lang="en-US" dirty="0" smtClean="0"/>
+              <a:t>Introduce each of the major topics.</a:t>
+            </a:r>
+          </a:p>
+          <a:p>
+            <a:r>
+              <a:rPr lang="en-US" dirty="0" smtClean="0"/>
+              <a:t>To provide a road map for the audience, you</a:t>
+            </a:r>
+            <a:r>
+              <a:rPr lang="en-US" baseline="0" dirty="0" smtClean="0"/>
+              <a:t> can </a:t>
+            </a:r>
+            <a:r>
+              <a:rPr lang="en-US" dirty="0" smtClean="0"/>
+              <a:t>repeat this Overview slide throughout the presentation, highlighting the particular topic you will discuss next.</a:t>
+            </a:r>
+          </a:p>
+        </p:txBody>
+      </p:sp>
+      <p:sp>
+        <p:nvSpPr>
+          <p:cNvPr id="4" name="Slide Number Placeholder 3"/>
+          <p:cNvSpPr>
+            <a:spLocks noGrp="1"/>
+          </p:cNvSpPr>
+          <p:nvPr>
+            <p:ph type="sldNum" sz="quarter" idx="10"/>
+          </p:nvPr>
+        </p:nvSpPr>
+        <p:spPr/>
+        <p:txBody>
           <a:bodyPr/>
           <a:lstStyle/>
           <a:p>
+            <a:fld id="{EC6EAC7D-5A89-47C2-8ABA-56C9C2DEF7A4}" type="slidenum">
+              <a:rPr lang="en-US" smtClean="0"/>
+              <a:pPr/>
+              <a:t>10</a:t>
+            </a:fld>
             <a:endParaRPr lang="en-US"/>
           </a:p>
         </p:txBody>
       </p:sp>
-      <p:sp>
-        <p:nvSpPr>
-          <p:cNvPr id="4" name="Slide Number Placeholder 3"/>
-          <p:cNvSpPr>
-            <a:spLocks noGrp="1"/>
-          </p:cNvSpPr>
-          <p:nvPr>
-            <p:ph type="sldNum" sz="quarter" idx="10"/>
+    </p:spTree>
+  </p:cSld>
+  <p:clrMapOvr>
+    <a:masterClrMapping/>
+  </p:clrMapOvr>
+</p:notes>
+</file>
+
+<file path=ppt/notesSlides/notesSlide11.xml><?xml version="1.0" encoding="utf-8"?>
+<p:notes xmlns:a="http://schemas.openxmlformats.org/drawingml/2006/main" xmlns:r="http://schemas.openxmlformats.org/officeDocument/2006/relationships" xmlns:p="http://schemas.openxmlformats.org/presentationml/2006/main">
+  <p:cSld>
+    <p:spTree>
+      <p:nvGrpSpPr>
+        <p:cNvPr id="1" name=""/>
+        <p:cNvGrpSpPr/>
+        <p:nvPr/>
+      </p:nvGrpSpPr>
+      <p:grpSpPr>
+        <a:xfrm>
+          <a:off x="0" y="0"/>
+          <a:ext cx="0" cy="0"/>
+          <a:chOff x="0" y="0"/>
+          <a:chExt cx="0" cy="0"/>
+        </a:xfrm>
+      </p:grpSpPr>
+      <p:sp>
+        <p:nvSpPr>
+          <p:cNvPr id="2" name="Slide Image Placeholder 1"/>
+          <p:cNvSpPr>
+            <a:spLocks noGrp="1" noRot="1" noChangeAspect="1"/>
+          </p:cNvSpPr>
+          <p:nvPr>
+            <p:ph type="sldImg"/>
+          </p:nvPr>
+        </p:nvSpPr>
+        <p:spPr/>
+      </p:sp>
+      <p:sp>
+        <p:nvSpPr>
+          <p:cNvPr id="3" name="Notes Placeholder 2"/>
+          <p:cNvSpPr>
+            <a:spLocks noGrp="1"/>
+          </p:cNvSpPr>
+          <p:nvPr>
+            <p:ph type="body" idx="1"/>
           </p:nvPr>
         </p:nvSpPr>
         <p:spPr/>
@@ -977,10 +1083,29 @@
           <a:bodyPr/>
           <a:lstStyle/>
           <a:p>
+            <a:endParaRPr lang="en-US"/>
+          </a:p>
+        </p:txBody>
+      </p:sp>
+      <p:sp>
+        <p:nvSpPr>
+          <p:cNvPr id="4" name="Slide Number Placeholder 3"/>
+          <p:cNvSpPr>
+            <a:spLocks noGrp="1"/>
+          </p:cNvSpPr>
+          <p:nvPr>
+            <p:ph type="sldNum" sz="quarter" idx="10"/>
+          </p:nvPr>
+        </p:nvSpPr>
+        <p:spPr/>
+        <p:txBody>
+          <a:bodyPr/>
+          <a:lstStyle/>
+          <a:p>
             <a:fld id="{75693FD4-8F83-4EF7-AC3F-0DC0388986B0}" type="slidenum">
               <a:rPr lang="en-US" smtClean="0"/>
               <a:pPr/>
-              <a:t>10</a:t>
+              <a:t>11</a:t>
             </a:fld>
             <a:endParaRPr lang="en-US"/>
           </a:p>
@@ -2403,7 +2528,7 @@
             <a:fld id="{757B281C-5159-4971-8228-52B9A72E9ED2}" type="datetimeFigureOut">
               <a:rPr lang="en-US" smtClean="0"/>
               <a:pPr/>
-              <a:t>11/4/2010</a:t>
+              <a:t>11/6/2010</a:t>
             </a:fld>
             <a:endParaRPr lang="en-US" dirty="0"/>
           </a:p>
@@ -2505,7 +2630,7 @@
             <a:fld id="{757B281C-5159-4971-8228-52B9A72E9ED2}" type="datetimeFigureOut">
               <a:rPr lang="en-US" smtClean="0"/>
               <a:pPr/>
-              <a:t>11/4/2010</a:t>
+              <a:t>11/6/2010</a:t>
             </a:fld>
             <a:endParaRPr lang="en-US" dirty="0"/>
           </a:p>
@@ -2641,7 +2766,7 @@
             <a:fld id="{757B281C-5159-4971-8228-52B9A72E9ED2}" type="datetimeFigureOut">
               <a:rPr lang="en-US" smtClean="0"/>
               <a:pPr/>
-              <a:t>11/4/2010</a:t>
+              <a:t>11/6/2010</a:t>
             </a:fld>
             <a:endParaRPr lang="en-US" dirty="0"/>
           </a:p>
@@ -2847,7 +2972,7 @@
             <a:fld id="{757B281C-5159-4971-8228-52B9A72E9ED2}" type="datetimeFigureOut">
               <a:rPr lang="en-US" smtClean="0"/>
               <a:pPr/>
-              <a:t>11/4/2010</a:t>
+              <a:t>11/6/2010</a:t>
             </a:fld>
             <a:endParaRPr lang="en-US" dirty="0"/>
           </a:p>
@@ -3246,7 +3371,7 @@
             <a:fld id="{757B281C-5159-4971-8228-52B9A72E9ED2}" type="datetimeFigureOut">
               <a:rPr lang="en-US" smtClean="0"/>
               <a:pPr/>
-              <a:t>11/4/2010</a:t>
+              <a:t>11/6/2010</a:t>
             </a:fld>
             <a:endParaRPr lang="en-US" dirty="0"/>
           </a:p>
@@ -3546,7 +3671,7 @@
             <a:fld id="{757B281C-5159-4971-8228-52B9A72E9ED2}" type="datetimeFigureOut">
               <a:rPr lang="en-US" smtClean="0"/>
               <a:pPr/>
-              <a:t>11/4/2010</a:t>
+              <a:t>11/6/2010</a:t>
             </a:fld>
             <a:endParaRPr lang="en-US" dirty="0"/>
           </a:p>
@@ -3975,7 +4100,7 @@
             <a:fld id="{757B281C-5159-4971-8228-52B9A72E9ED2}" type="datetimeFigureOut">
               <a:rPr lang="en-US" smtClean="0"/>
               <a:pPr/>
-              <a:t>11/4/2010</a:t>
+              <a:t>11/6/2010</a:t>
             </a:fld>
             <a:endParaRPr lang="en-US" dirty="0"/>
           </a:p>
@@ -4252,7 +4377,7 @@
             <a:fld id="{757B281C-5159-4971-8228-52B9A72E9ED2}" type="datetimeFigureOut">
               <a:rPr lang="en-US" smtClean="0"/>
               <a:pPr/>
-              <a:t>11/4/2010</a:t>
+              <a:t>11/6/2010</a:t>
             </a:fld>
             <a:endParaRPr lang="en-US" dirty="0"/>
           </a:p>
@@ -4516,7 +4641,7 @@
             <a:fld id="{757B281C-5159-4971-8228-52B9A72E9ED2}" type="datetimeFigureOut">
               <a:rPr lang="en-US" smtClean="0"/>
               <a:pPr/>
-              <a:t>11/4/2010</a:t>
+              <a:t>11/6/2010</a:t>
             </a:fld>
             <a:endParaRPr lang="en-US" dirty="0"/>
           </a:p>
@@ -4686,7 +4811,7 @@
             <a:fld id="{757B281C-5159-4971-8228-52B9A72E9ED2}" type="datetimeFigureOut">
               <a:rPr lang="en-US" smtClean="0"/>
               <a:pPr/>
-              <a:t>11/4/2010</a:t>
+              <a:t>11/6/2010</a:t>
             </a:fld>
             <a:endParaRPr lang="en-US" dirty="0"/>
           </a:p>
@@ -4866,7 +4991,7 @@
             <a:fld id="{757B281C-5159-4971-8228-52B9A72E9ED2}" type="datetimeFigureOut">
               <a:rPr lang="en-US" smtClean="0"/>
               <a:pPr/>
-              <a:t>11/4/2010</a:t>
+              <a:t>11/6/2010</a:t>
             </a:fld>
             <a:endParaRPr lang="en-US" dirty="0"/>
           </a:p>
@@ -5108,7 +5233,7 @@
             <a:fld id="{757B281C-5159-4971-8228-52B9A72E9ED2}" type="datetimeFigureOut">
               <a:rPr lang="en-US" smtClean="0"/>
               <a:pPr/>
-              <a:t>11/4/2010</a:t>
+              <a:t>11/6/2010</a:t>
             </a:fld>
             <a:endParaRPr lang="en-US" dirty="0"/>
           </a:p>
@@ -5653,6 +5778,466 @@
       </p:grpSpPr>
       <p:sp>
         <p:nvSpPr>
+          <p:cNvPr id="2" name="Title 1"/>
+          <p:cNvSpPr>
+            <a:spLocks noGrp="1"/>
+          </p:cNvSpPr>
+          <p:nvPr>
+            <p:ph type="title"/>
+            <p:custDataLst>
+              <p:tags r:id="rId2"/>
+            </p:custDataLst>
+          </p:nvPr>
+        </p:nvSpPr>
+        <p:spPr/>
+        <p:txBody>
+          <a:bodyPr/>
+          <a:lstStyle/>
+          <a:p>
+            <a:r>
+              <a:rPr lang="en-US" dirty="0" smtClean="0"/>
+              <a:t>Final points</a:t>
+            </a:r>
+            <a:endParaRPr lang="en-US" dirty="0"/>
+          </a:p>
+        </p:txBody>
+      </p:sp>
+      <p:sp>
+        <p:nvSpPr>
+          <p:cNvPr id="5" name="Content Placeholder 4"/>
+          <p:cNvSpPr>
+            <a:spLocks noGrp="1"/>
+          </p:cNvSpPr>
+          <p:nvPr>
+            <p:ph idx="1"/>
+            <p:custDataLst>
+              <p:tags r:id="rId3"/>
+            </p:custDataLst>
+          </p:nvPr>
+        </p:nvSpPr>
+        <p:spPr/>
+        <p:txBody>
+          <a:bodyPr>
+            <a:noAutofit/>
+          </a:bodyPr>
+          <a:lstStyle/>
+          <a:p>
+            <a:r>
+              <a:rPr lang="en-US" sz="2800" dirty="0" smtClean="0"/>
+              <a:t>BDD development works great when you have non-programmers participate in the specs.</a:t>
+            </a:r>
+            <a:endParaRPr lang="en-US" sz="2800" dirty="0" smtClean="0"/>
+          </a:p>
+          <a:p>
+            <a:r>
+              <a:rPr lang="en-US" sz="2800" dirty="0" smtClean="0"/>
+              <a:t>However, even if you’re the only person doing BDD, there’s still a lot of value to it.</a:t>
+            </a:r>
+            <a:endParaRPr lang="en-US" sz="2800" dirty="0" smtClean="0"/>
+          </a:p>
+          <a:p>
+            <a:r>
+              <a:rPr lang="en-US" sz="2800" dirty="0" smtClean="0"/>
+              <a:t>It’s your responsibility to write code that works.</a:t>
+            </a:r>
+          </a:p>
+          <a:p>
+            <a:r>
+              <a:rPr lang="en-US" sz="2800" dirty="0" smtClean="0"/>
+              <a:t>It’s your responsibility to be able to explain how your software works.</a:t>
+            </a:r>
+          </a:p>
+          <a:p>
+            <a:r>
+              <a:rPr lang="en-US" sz="2800" smtClean="0"/>
+              <a:t>Just give it an honest try.</a:t>
+            </a:r>
+            <a:endParaRPr lang="en-US" sz="2800" dirty="0" smtClean="0"/>
+          </a:p>
+          <a:p>
+            <a:endParaRPr lang="en-US" dirty="0"/>
+          </a:p>
+          <a:p>
+            <a:endParaRPr lang="en-US" dirty="0" smtClean="0"/>
+          </a:p>
+        </p:txBody>
+      </p:sp>
+    </p:spTree>
+    <p:custDataLst>
+      <p:tags r:id="rId1"/>
+    </p:custDataLst>
+    <p:extLst>
+      <p:ext uri="{BB962C8B-B14F-4D97-AF65-F5344CB8AC3E}">
+        <p14:creationId xmlns:p14="http://schemas.microsoft.com/office/powerpoint/2010/main" val="803832532"/>
+      </p:ext>
+    </p:extLst>
+  </p:cSld>
+  <p:clrMapOvr>
+    <a:masterClrMapping/>
+  </p:clrMapOvr>
+  <p:transition spd="slow">
+    <p:wipe dir="d"/>
+  </p:transition>
+  <p:timing>
+    <p:tnLst>
+      <p:par>
+        <p:cTn id="1" dur="indefinite" restart="never" nodeType="tmRoot">
+          <p:childTnLst>
+            <p:seq concurrent="1" nextAc="seek">
+              <p:cTn id="2" dur="indefinite" nodeType="mainSeq">
+                <p:childTnLst>
+                  <p:par>
+                    <p:cTn id="3" fill="hold">
+                      <p:stCondLst>
+                        <p:cond delay="indefinite"/>
+                      </p:stCondLst>
+                      <p:childTnLst>
+                        <p:par>
+                          <p:cTn id="4" fill="hold">
+                            <p:stCondLst>
+                              <p:cond delay="0"/>
+                            </p:stCondLst>
+                            <p:childTnLst>
+                              <p:par>
+                                <p:cTn id="5" presetID="10" presetClass="entr" presetSubtype="0" fill="hold" grpId="0" nodeType="clickEffect">
+                                  <p:stCondLst>
+                                    <p:cond delay="0"/>
+                                  </p:stCondLst>
+                                  <p:childTnLst>
+                                    <p:set>
+                                      <p:cBhvr>
+                                        <p:cTn id="6" dur="1" fill="hold">
+                                          <p:stCondLst>
+                                            <p:cond delay="0"/>
+                                          </p:stCondLst>
+                                        </p:cTn>
+                                        <p:tgtEl>
+                                          <p:spTgt spid="5">
+                                            <p:txEl>
+                                              <p:pRg st="0" end="0"/>
+                                            </p:txEl>
+                                          </p:spTgt>
+                                        </p:tgtEl>
+                                        <p:attrNameLst>
+                                          <p:attrName>style.visibility</p:attrName>
+                                        </p:attrNameLst>
+                                      </p:cBhvr>
+                                      <p:to>
+                                        <p:strVal val="visible"/>
+                                      </p:to>
+                                    </p:set>
+                                    <p:animEffect transition="in" filter="fade">
+                                      <p:cBhvr>
+                                        <p:cTn id="7" dur="500"/>
+                                        <p:tgtEl>
+                                          <p:spTgt spid="5">
+                                            <p:txEl>
+                                              <p:pRg st="0" end="0"/>
+                                            </p:txEl>
+                                          </p:spTgt>
+                                        </p:tgtEl>
+                                      </p:cBhvr>
+                                    </p:animEffect>
+                                  </p:childTnLst>
+                                </p:cTn>
+                              </p:par>
+                            </p:childTnLst>
+                          </p:cTn>
+                        </p:par>
+                      </p:childTnLst>
+                    </p:cTn>
+                  </p:par>
+                  <p:par>
+                    <p:cTn id="8" fill="hold">
+                      <p:stCondLst>
+                        <p:cond delay="indefinite"/>
+                      </p:stCondLst>
+                      <p:childTnLst>
+                        <p:par>
+                          <p:cTn id="9" fill="hold">
+                            <p:stCondLst>
+                              <p:cond delay="0"/>
+                            </p:stCondLst>
+                            <p:childTnLst>
+                              <p:par>
+                                <p:cTn id="10" presetID="10" presetClass="entr" presetSubtype="0" fill="hold" grpId="0" nodeType="clickEffect">
+                                  <p:stCondLst>
+                                    <p:cond delay="0"/>
+                                  </p:stCondLst>
+                                  <p:childTnLst>
+                                    <p:set>
+                                      <p:cBhvr>
+                                        <p:cTn id="11" dur="1" fill="hold">
+                                          <p:stCondLst>
+                                            <p:cond delay="0"/>
+                                          </p:stCondLst>
+                                        </p:cTn>
+                                        <p:tgtEl>
+                                          <p:spTgt spid="5">
+                                            <p:txEl>
+                                              <p:pRg st="1" end="1"/>
+                                            </p:txEl>
+                                          </p:spTgt>
+                                        </p:tgtEl>
+                                        <p:attrNameLst>
+                                          <p:attrName>style.visibility</p:attrName>
+                                        </p:attrNameLst>
+                                      </p:cBhvr>
+                                      <p:to>
+                                        <p:strVal val="visible"/>
+                                      </p:to>
+                                    </p:set>
+                                    <p:animEffect transition="in" filter="fade">
+                                      <p:cBhvr>
+                                        <p:cTn id="12" dur="500"/>
+                                        <p:tgtEl>
+                                          <p:spTgt spid="5">
+                                            <p:txEl>
+                                              <p:pRg st="1" end="1"/>
+                                            </p:txEl>
+                                          </p:spTgt>
+                                        </p:tgtEl>
+                                      </p:cBhvr>
+                                    </p:animEffect>
+                                  </p:childTnLst>
+                                </p:cTn>
+                              </p:par>
+                            </p:childTnLst>
+                          </p:cTn>
+                        </p:par>
+                      </p:childTnLst>
+                    </p:cTn>
+                  </p:par>
+                  <p:par>
+                    <p:cTn id="13" fill="hold">
+                      <p:stCondLst>
+                        <p:cond delay="indefinite"/>
+                      </p:stCondLst>
+                      <p:childTnLst>
+                        <p:par>
+                          <p:cTn id="14" fill="hold">
+                            <p:stCondLst>
+                              <p:cond delay="0"/>
+                            </p:stCondLst>
+                            <p:childTnLst>
+                              <p:par>
+                                <p:cTn id="15" presetID="10" presetClass="entr" presetSubtype="0" fill="hold" grpId="0" nodeType="clickEffect">
+                                  <p:stCondLst>
+                                    <p:cond delay="0"/>
+                                  </p:stCondLst>
+                                  <p:childTnLst>
+                                    <p:set>
+                                      <p:cBhvr>
+                                        <p:cTn id="16" dur="1" fill="hold">
+                                          <p:stCondLst>
+                                            <p:cond delay="0"/>
+                                          </p:stCondLst>
+                                        </p:cTn>
+                                        <p:tgtEl>
+                                          <p:spTgt spid="5">
+                                            <p:txEl>
+                                              <p:pRg st="2" end="2"/>
+                                            </p:txEl>
+                                          </p:spTgt>
+                                        </p:tgtEl>
+                                        <p:attrNameLst>
+                                          <p:attrName>style.visibility</p:attrName>
+                                        </p:attrNameLst>
+                                      </p:cBhvr>
+                                      <p:to>
+                                        <p:strVal val="visible"/>
+                                      </p:to>
+                                    </p:set>
+                                    <p:animEffect transition="in" filter="fade">
+                                      <p:cBhvr>
+                                        <p:cTn id="17" dur="500"/>
+                                        <p:tgtEl>
+                                          <p:spTgt spid="5">
+                                            <p:txEl>
+                                              <p:pRg st="2" end="2"/>
+                                            </p:txEl>
+                                          </p:spTgt>
+                                        </p:tgtEl>
+                                      </p:cBhvr>
+                                    </p:animEffect>
+                                  </p:childTnLst>
+                                </p:cTn>
+                              </p:par>
+                            </p:childTnLst>
+                          </p:cTn>
+                        </p:par>
+                      </p:childTnLst>
+                    </p:cTn>
+                  </p:par>
+                  <p:par>
+                    <p:cTn id="18" fill="hold">
+                      <p:stCondLst>
+                        <p:cond delay="indefinite"/>
+                      </p:stCondLst>
+                      <p:childTnLst>
+                        <p:par>
+                          <p:cTn id="19" fill="hold">
+                            <p:stCondLst>
+                              <p:cond delay="0"/>
+                            </p:stCondLst>
+                            <p:childTnLst>
+                              <p:par>
+                                <p:cTn id="20" presetID="10" presetClass="entr" presetSubtype="0" fill="hold" grpId="0" nodeType="clickEffect">
+                                  <p:stCondLst>
+                                    <p:cond delay="0"/>
+                                  </p:stCondLst>
+                                  <p:childTnLst>
+                                    <p:set>
+                                      <p:cBhvr>
+                                        <p:cTn id="21" dur="1" fill="hold">
+                                          <p:stCondLst>
+                                            <p:cond delay="0"/>
+                                          </p:stCondLst>
+                                        </p:cTn>
+                                        <p:tgtEl>
+                                          <p:spTgt spid="5">
+                                            <p:txEl>
+                                              <p:pRg st="3" end="3"/>
+                                            </p:txEl>
+                                          </p:spTgt>
+                                        </p:tgtEl>
+                                        <p:attrNameLst>
+                                          <p:attrName>style.visibility</p:attrName>
+                                        </p:attrNameLst>
+                                      </p:cBhvr>
+                                      <p:to>
+                                        <p:strVal val="visible"/>
+                                      </p:to>
+                                    </p:set>
+                                    <p:animEffect transition="in" filter="fade">
+                                      <p:cBhvr>
+                                        <p:cTn id="22" dur="500"/>
+                                        <p:tgtEl>
+                                          <p:spTgt spid="5">
+                                            <p:txEl>
+                                              <p:pRg st="3" end="3"/>
+                                            </p:txEl>
+                                          </p:spTgt>
+                                        </p:tgtEl>
+                                      </p:cBhvr>
+                                    </p:animEffect>
+                                  </p:childTnLst>
+                                </p:cTn>
+                              </p:par>
+                            </p:childTnLst>
+                          </p:cTn>
+                        </p:par>
+                      </p:childTnLst>
+                    </p:cTn>
+                  </p:par>
+                  <p:par>
+                    <p:cTn id="23" fill="hold">
+                      <p:stCondLst>
+                        <p:cond delay="indefinite"/>
+                      </p:stCondLst>
+                      <p:childTnLst>
+                        <p:par>
+                          <p:cTn id="24" fill="hold">
+                            <p:stCondLst>
+                              <p:cond delay="0"/>
+                            </p:stCondLst>
+                            <p:childTnLst>
+                              <p:par>
+                                <p:cTn id="25" presetID="10" presetClass="entr" presetSubtype="0" fill="hold" grpId="0" nodeType="clickEffect">
+                                  <p:stCondLst>
+                                    <p:cond delay="0"/>
+                                  </p:stCondLst>
+                                  <p:childTnLst>
+                                    <p:set>
+                                      <p:cBhvr>
+                                        <p:cTn id="26" dur="1" fill="hold">
+                                          <p:stCondLst>
+                                            <p:cond delay="0"/>
+                                          </p:stCondLst>
+                                        </p:cTn>
+                                        <p:tgtEl>
+                                          <p:spTgt spid="5">
+                                            <p:txEl>
+                                              <p:pRg st="4" end="4"/>
+                                            </p:txEl>
+                                          </p:spTgt>
+                                        </p:tgtEl>
+                                        <p:attrNameLst>
+                                          <p:attrName>style.visibility</p:attrName>
+                                        </p:attrNameLst>
+                                      </p:cBhvr>
+                                      <p:to>
+                                        <p:strVal val="visible"/>
+                                      </p:to>
+                                    </p:set>
+                                    <p:animEffect transition="in" filter="fade">
+                                      <p:cBhvr>
+                                        <p:cTn id="27" dur="500"/>
+                                        <p:tgtEl>
+                                          <p:spTgt spid="5">
+                                            <p:txEl>
+                                              <p:pRg st="4" end="4"/>
+                                            </p:txEl>
+                                          </p:spTgt>
+                                        </p:tgtEl>
+                                      </p:cBhvr>
+                                    </p:animEffect>
+                                  </p:childTnLst>
+                                </p:cTn>
+                              </p:par>
+                            </p:childTnLst>
+                          </p:cTn>
+                        </p:par>
+                      </p:childTnLst>
+                    </p:cTn>
+                  </p:par>
+                </p:childTnLst>
+              </p:cTn>
+              <p:prevCondLst>
+                <p:cond evt="onPrev" delay="0">
+                  <p:tgtEl>
+                    <p:sldTgt/>
+                  </p:tgtEl>
+                </p:cond>
+              </p:prevCondLst>
+              <p:nextCondLst>
+                <p:cond evt="onNext" delay="0">
+                  <p:tgtEl>
+                    <p:sldTgt/>
+                  </p:tgtEl>
+                </p:cond>
+              </p:nextCondLst>
+            </p:seq>
+          </p:childTnLst>
+        </p:cTn>
+      </p:par>
+    </p:tnLst>
+    <p:bldLst>
+      <p:bldP spid="5" grpId="0" build="p"/>
+    </p:bldLst>
+  </p:timing>
+</p:sld>
+</file>
+
+<file path=ppt/slides/slide11.xml><?xml version="1.0" encoding="utf-8"?>
+<p:sld xmlns:a="http://schemas.openxmlformats.org/drawingml/2006/main" xmlns:r="http://schemas.openxmlformats.org/officeDocument/2006/relationships" xmlns:p="http://schemas.openxmlformats.org/presentationml/2006/main">
+  <p:cSld>
+    <p:spTree>
+      <p:nvGrpSpPr>
+        <p:cNvPr id="1" name=""/>
+        <p:cNvGrpSpPr/>
+        <p:nvPr/>
+      </p:nvGrpSpPr>
+      <p:grpSpPr>
+        <a:xfrm>
+          <a:off x="0" y="0"/>
+          <a:ext cx="0" cy="0"/>
+          <a:chOff x="0" y="0"/>
+          <a:chExt cx="0" cy="0"/>
+        </a:xfrm>
+      </p:grpSpPr>
+      <p:sp>
+        <p:nvSpPr>
           <p:cNvPr id="7" name="TextBox 6"/>
           <p:cNvSpPr txBox="1"/>
           <p:nvPr/>
@@ -5871,15 +6456,7 @@
           <a:p>
             <a:r>
               <a:rPr lang="en-US" dirty="0" smtClean="0"/>
-              <a:t>A few of these </a:t>
-            </a:r>
-            <a:r>
-              <a:rPr lang="en-US" dirty="0" smtClean="0"/>
-              <a:t>promotion </a:t>
-            </a:r>
-            <a:r>
-              <a:rPr lang="en-US" dirty="0" smtClean="0"/>
-              <a:t>codes have prizes attached.</a:t>
+              <a:t>A few of these promotion codes have prizes attached.</a:t>
             </a:r>
           </a:p>
           <a:p>
@@ -6648,14 +7225,12 @@
               <a:rPr lang="en-US" dirty="0" smtClean="0"/>
               <a:t>Finally start on the part of the application that the user can see. </a:t>
             </a:r>
-            <a:endParaRPr lang="en-US" dirty="0" smtClean="0"/>
           </a:p>
           <a:p>
             <a:r>
               <a:rPr lang="en-US" dirty="0" smtClean="0"/>
               <a:t>Plug your architecture into the front side.  And when/if it doesn’t prove to be a good fit, bash the square peg into the round hole.</a:t>
             </a:r>
-            <a:endParaRPr lang="en-US" dirty="0" smtClean="0"/>
           </a:p>
         </p:txBody>
       </p:sp>
@@ -7356,11 +7931,7 @@
           <a:p>
             <a:r>
               <a:rPr lang="en-US" dirty="0" smtClean="0"/>
-              <a:t>The focus is on th</a:t>
-            </a:r>
-            <a:r>
-              <a:rPr lang="en-US" dirty="0" smtClean="0"/>
-              <a:t>e business requirements.</a:t>
+              <a:t>The focus is on the business requirements.</a:t>
             </a:r>
           </a:p>
           <a:p>
@@ -8591,6 +9162,24 @@
 </file>
 
 <file path=ppt/tags/tag24.xml><?xml version="1.0" encoding="utf-8"?>
+<p:tagLst xmlns:a="http://schemas.openxmlformats.org/drawingml/2006/main" xmlns:r="http://schemas.openxmlformats.org/officeDocument/2006/relationships" xmlns:p="http://schemas.openxmlformats.org/presentationml/2006/main">
+  <p:tag name="DVSHAPEID" val="retnMj4SFfqbVIhVK0Rf83"/>
+</p:tagLst>
+</file>
+
+<file path=ppt/tags/tag25.xml><?xml version="1.0" encoding="utf-8"?>
+<p:tagLst xmlns:a="http://schemas.openxmlformats.org/drawingml/2006/main" xmlns:r="http://schemas.openxmlformats.org/officeDocument/2006/relationships" xmlns:p="http://schemas.openxmlformats.org/presentationml/2006/main">
+  <p:tag name="DVSECTIONID" val="QUq8QELArFIgadhH063fpq"/>
+</p:tagLst>
+</file>
+
+<file path=ppt/tags/tag26.xml><?xml version="1.0" encoding="utf-8"?>
+<p:tagLst xmlns:a="http://schemas.openxmlformats.org/drawingml/2006/main" xmlns:r="http://schemas.openxmlformats.org/officeDocument/2006/relationships" xmlns:p="http://schemas.openxmlformats.org/presentationml/2006/main">
+  <p:tag name="DVSHAPEID" val="InkrlxYPS4jAzciXk8ToAM"/>
+</p:tagLst>
+</file>
+
+<file path=ppt/tags/tag27.xml><?xml version="1.0" encoding="utf-8"?>
 <p:tagLst xmlns:a="http://schemas.openxmlformats.org/drawingml/2006/main" xmlns:r="http://schemas.openxmlformats.org/officeDocument/2006/relationships" xmlns:p="http://schemas.openxmlformats.org/presentationml/2006/main">
   <p:tag name="DVSHAPEID" val="retnMj4SFfqbVIhVK0Rf83"/>
 </p:tagLst>

</xml_diff>